<commit_message>
Adding support for multi slide bhajans
</commit_message>
<xml_diff>
--- a/WebContent/WEB-INF/templates/GAB2015/master.pptx
+++ b/WebContent/WEB-INF/templates/GAB2015/master.pptx
@@ -4172,18 +4172,6 @@
               <a:buNone/>
             </a:pPr>
             <a:r>
-              <a:rPr lang="en" sz="2800" dirty="0">
-                <a:solidFill>
-                  <a:srgbClr val="FFFFFF"/>
-                </a:solidFill>
-                <a:latin typeface="Calibri"/>
-                <a:ea typeface="Calibri"/>
-                <a:cs typeface="Calibri"/>
-                <a:sym typeface="Calibri"/>
-              </a:rPr>
-              <a:t>Bhajo Mana Krishna </a:t>
-            </a:r>
-            <a:r>
               <a:rPr lang="en" sz="2800" dirty="0" smtClean="0">
                 <a:solidFill>
                   <a:srgbClr val="FFFFFF"/>
@@ -4193,7 +4181,7 @@
                 <a:cs typeface="Calibri"/>
                 <a:sym typeface="Calibri"/>
               </a:rPr>
-              <a:t>Gopal</a:t>
+              <a:t>Bhajo</a:t>
             </a:r>
             <a:endParaRPr lang="en" sz="2800" dirty="0">
               <a:solidFill>
@@ -4239,7 +4227,7 @@
               <a:buNone/>
             </a:pPr>
             <a:r>
-              <a:rPr lang="en" i="1">
+              <a:rPr lang="en" i="1" dirty="0">
                 <a:solidFill>
                   <a:schemeClr val="lt1"/>
                 </a:solidFill>
@@ -4248,37 +4236,9 @@
                 <a:cs typeface="Times New Roman"/>
                 <a:sym typeface="Times New Roman"/>
               </a:rPr>
-              <a:t>O Mind! Chant the name of Krishna; who is known as Gopala, Mukunda and Govinda; </a:t>
+              <a:t>O Mind! </a:t>
             </a:r>
-          </a:p>
-          <a:p>
-            <a:pPr lvl="0" algn="ctr" rtl="0">
-              <a:spcBef>
-                <a:spcPts val="0"/>
-              </a:spcBef>
-              <a:buNone/>
-            </a:pPr>
-            <a:r>
-              <a:rPr lang="en" i="1">
-                <a:solidFill>
-                  <a:schemeClr val="lt1"/>
-                </a:solidFill>
-                <a:latin typeface="Times New Roman"/>
-                <a:ea typeface="Times New Roman"/>
-                <a:cs typeface="Times New Roman"/>
-                <a:sym typeface="Times New Roman"/>
-              </a:rPr>
-              <a:t>beloved son of Nanda</a:t>
-            </a:r>
-          </a:p>
-          <a:p>
-            <a:pPr lvl="0" algn="ctr" rtl="0">
-              <a:spcBef>
-                <a:spcPts val="0"/>
-              </a:spcBef>
-              <a:buNone/>
-            </a:pPr>
-            <a:endParaRPr sz="2800"/>
+            <a:endParaRPr sz="2800" dirty="0"/>
           </a:p>
         </p:txBody>
       </p:sp>

</xml_diff>